<commit_message>
Generate results and refactor
</commit_message>
<xml_diff>
--- a/Documents/Kasakyan_James_Proposal_Final_Presentation.pptx
+++ b/Documents/Kasakyan_James_Proposal_Final_Presentation.pptx
@@ -12,8 +12,10 @@
     <p:sldId id="264" r:id="rId6"/>
     <p:sldId id="265" r:id="rId7"/>
     <p:sldId id="261" r:id="rId8"/>
-    <p:sldId id="262" r:id="rId9"/>
-    <p:sldId id="263" r:id="rId10"/>
+    <p:sldId id="266" r:id="rId9"/>
+    <p:sldId id="267" r:id="rId10"/>
+    <p:sldId id="262" r:id="rId11"/>
+    <p:sldId id="263" r:id="rId12"/>
   </p:sldIdLst>
   <p:sldSz cx="9144000" cy="6858000" type="screen4x3"/>
   <p:notesSz cx="6858000" cy="9144000"/>
@@ -5052,6 +5054,195 @@
   <p:clrMapOvr>
     <a:masterClrMapping/>
   </p:clrMapOvr>
+</p:sld>
+</file>
+
+<file path=ppt/slides/slide10.xml><?xml version="1.0" encoding="utf-8"?>
+<p:sld xmlns:a="http://schemas.openxmlformats.org/drawingml/2006/main" xmlns:r="http://schemas.openxmlformats.org/officeDocument/2006/relationships" xmlns:p="http://schemas.openxmlformats.org/presentationml/2006/main">
+  <p:cSld>
+    <p:spTree>
+      <p:nvGrpSpPr>
+        <p:cNvPr id="1" name=""/>
+        <p:cNvGrpSpPr/>
+        <p:nvPr/>
+      </p:nvGrpSpPr>
+      <p:grpSpPr>
+        <a:xfrm>
+          <a:off x="0" y="0"/>
+          <a:ext cx="0" cy="0"/>
+          <a:chOff x="0" y="0"/>
+          <a:chExt cx="0" cy="0"/>
+        </a:xfrm>
+      </p:grpSpPr>
+      <p:sp>
+        <p:nvSpPr>
+          <p:cNvPr id="2" name="Title 1"/>
+          <p:cNvSpPr>
+            <a:spLocks noGrp="1"/>
+          </p:cNvSpPr>
+          <p:nvPr>
+            <p:ph type="title"/>
+          </p:nvPr>
+        </p:nvSpPr>
+        <p:spPr/>
+        <p:txBody>
+          <a:bodyPr/>
+          <a:lstStyle/>
+          <a:p>
+            <a:r>
+              <a:rPr lang="en-US" dirty="0" smtClean="0"/>
+              <a:t>Project Deliverables</a:t>
+            </a:r>
+            <a:endParaRPr lang="en-US" dirty="0"/>
+          </a:p>
+        </p:txBody>
+      </p:sp>
+      <p:sp>
+        <p:nvSpPr>
+          <p:cNvPr id="3" name="Content Placeholder 2"/>
+          <p:cNvSpPr>
+            <a:spLocks noGrp="1"/>
+          </p:cNvSpPr>
+          <p:nvPr>
+            <p:ph idx="1"/>
+          </p:nvPr>
+        </p:nvSpPr>
+        <p:spPr/>
+        <p:txBody>
+          <a:bodyPr/>
+          <a:lstStyle/>
+          <a:p>
+            <a:r>
+              <a:rPr lang="en-US" dirty="0" smtClean="0"/>
+              <a:t>Visualization: 2D </a:t>
+            </a:r>
+            <a:r>
+              <a:rPr lang="en-US" dirty="0" err="1" smtClean="0"/>
+              <a:t>Choropleth</a:t>
+            </a:r>
+            <a:r>
+              <a:rPr lang="en-US" dirty="0" smtClean="0"/>
+              <a:t> map</a:t>
+            </a:r>
+          </a:p>
+          <a:p>
+            <a:pPr lvl="1"/>
+            <a:r>
+              <a:rPr lang="en-US" dirty="0" smtClean="0"/>
+              <a:t>Partitioned by ZIP</a:t>
+            </a:r>
+            <a:endParaRPr lang="en-US" dirty="0"/>
+          </a:p>
+        </p:txBody>
+      </p:sp>
+      <p:pic>
+        <p:nvPicPr>
+          <p:cNvPr id="5" name="Picture 4"/>
+          <p:cNvPicPr>
+            <a:picLocks noChangeAspect="1"/>
+          </p:cNvPicPr>
+          <p:nvPr/>
+        </p:nvPicPr>
+        <p:blipFill>
+          <a:blip r:embed="rId2"/>
+          <a:stretch>
+            <a:fillRect/>
+          </a:stretch>
+        </p:blipFill>
+        <p:spPr>
+          <a:xfrm>
+            <a:off x="2192833" y="3465502"/>
+            <a:ext cx="4751246" cy="3178056"/>
+          </a:xfrm>
+          <a:prstGeom prst="rect">
+            <a:avLst/>
+          </a:prstGeom>
+        </p:spPr>
+      </p:pic>
+    </p:spTree>
+    <p:extLst>
+      <p:ext uri="{BB962C8B-B14F-4D97-AF65-F5344CB8AC3E}">
+        <p14:creationId xmlns:p14="http://schemas.microsoft.com/office/powerpoint/2010/main" val="974367304"/>
+      </p:ext>
+    </p:extLst>
+  </p:cSld>
+  <p:clrMapOvr>
+    <a:masterClrMapping/>
+  </p:clrMapOvr>
+  <p:timing>
+    <p:tnLst>
+      <p:par>
+        <p:cTn xmlns:p14="http://schemas.microsoft.com/office/powerpoint/2010/main" id="1" dur="indefinite" restart="never" nodeType="tmRoot"/>
+      </p:par>
+    </p:tnLst>
+  </p:timing>
+</p:sld>
+</file>
+
+<file path=ppt/slides/slide11.xml><?xml version="1.0" encoding="utf-8"?>
+<p:sld xmlns:a="http://schemas.openxmlformats.org/drawingml/2006/main" xmlns:r="http://schemas.openxmlformats.org/officeDocument/2006/relationships" xmlns:p="http://schemas.openxmlformats.org/presentationml/2006/main">
+  <p:cSld>
+    <p:spTree>
+      <p:nvGrpSpPr>
+        <p:cNvPr id="1" name=""/>
+        <p:cNvGrpSpPr/>
+        <p:nvPr/>
+      </p:nvGrpSpPr>
+      <p:grpSpPr>
+        <a:xfrm>
+          <a:off x="0" y="0"/>
+          <a:ext cx="0" cy="0"/>
+          <a:chOff x="0" y="0"/>
+          <a:chExt cx="0" cy="0"/>
+        </a:xfrm>
+      </p:grpSpPr>
+      <p:pic>
+        <p:nvPicPr>
+          <p:cNvPr id="11" name="Picture 10" descr="Screen Shot 2016-04-03 at 10.43.53 PM.png"/>
+          <p:cNvPicPr>
+            <a:picLocks noChangeAspect="1"/>
+          </p:cNvPicPr>
+          <p:nvPr/>
+        </p:nvPicPr>
+        <p:blipFill>
+          <a:blip r:embed="rId2">
+            <a:extLst>
+              <a:ext uri="{28A0092B-C50C-407E-A947-70E740481C1C}">
+                <a14:useLocalDpi xmlns:a14="http://schemas.microsoft.com/office/drawing/2010/main" val="0"/>
+              </a:ext>
+            </a:extLst>
+          </a:blip>
+          <a:stretch>
+            <a:fillRect/>
+          </a:stretch>
+        </p:blipFill>
+        <p:spPr>
+          <a:xfrm>
+            <a:off x="0" y="63500"/>
+            <a:ext cx="9144000" cy="6716389"/>
+          </a:xfrm>
+          <a:prstGeom prst="rect">
+            <a:avLst/>
+          </a:prstGeom>
+        </p:spPr>
+      </p:pic>
+    </p:spTree>
+    <p:extLst>
+      <p:ext uri="{BB962C8B-B14F-4D97-AF65-F5344CB8AC3E}">
+        <p14:creationId xmlns:p14="http://schemas.microsoft.com/office/powerpoint/2010/main" val="494958113"/>
+      </p:ext>
+    </p:extLst>
+  </p:cSld>
+  <p:clrMapOvr>
+    <a:masterClrMapping/>
+  </p:clrMapOvr>
+  <p:timing>
+    <p:tnLst>
+      <p:par>
+        <p:cTn xmlns:p14="http://schemas.microsoft.com/office/powerpoint/2010/main" id="1" dur="indefinite" restart="never" nodeType="tmRoot"/>
+      </p:par>
+    </p:tnLst>
+  </p:timing>
 </p:sld>
 </file>
 
@@ -6968,19 +7159,53 @@
           <a:p>
             <a:r>
               <a:rPr lang="en-US" dirty="0" smtClean="0"/>
-              <a:t>CSV is apparently a difficult concept </a:t>
-            </a:r>
-            <a:r>
-              <a:rPr lang="en-US" smtClean="0"/>
-              <a:t>to grasp</a:t>
-            </a:r>
-          </a:p>
-          <a:p>
-            <a:pPr lvl="1"/>
+              <a:t>CSV is apparently a difficult concept to grasp</a:t>
+            </a:r>
+          </a:p>
+          <a:p>
+            <a:pPr marL="0" indent="0">
+              <a:buNone/>
+            </a:pPr>
             <a:endParaRPr lang="en-US" dirty="0" smtClean="0"/>
           </a:p>
-        </p:txBody>
-      </p:sp>
+          <a:p>
+            <a:pPr marL="349250" lvl="1" indent="0">
+              <a:buNone/>
+            </a:pPr>
+            <a:endParaRPr lang="en-US" dirty="0" smtClean="0"/>
+          </a:p>
+        </p:txBody>
+      </p:sp>
+      <p:pic>
+        <p:nvPicPr>
+          <p:cNvPr id="8" name="Picture 7" descr="Screen Shot 2016-05-16 at 2.24.47 AM.png"/>
+          <p:cNvPicPr>
+            <a:picLocks noChangeAspect="1"/>
+          </p:cNvPicPr>
+          <p:nvPr/>
+        </p:nvPicPr>
+        <p:blipFill>
+          <a:blip r:embed="rId2">
+            <a:extLst>
+              <a:ext uri="{28A0092B-C50C-407E-A947-70E740481C1C}">
+                <a14:useLocalDpi xmlns:a14="http://schemas.microsoft.com/office/drawing/2010/main" val="0"/>
+              </a:ext>
+            </a:extLst>
+          </a:blip>
+          <a:stretch>
+            <a:fillRect/>
+          </a:stretch>
+        </p:blipFill>
+        <p:spPr>
+          <a:xfrm>
+            <a:off x="850900" y="4105900"/>
+            <a:ext cx="7442200" cy="2641600"/>
+          </a:xfrm>
+          <a:prstGeom prst="rect">
+            <a:avLst/>
+          </a:prstGeom>
+        </p:spPr>
+      </p:pic>
     </p:spTree>
     <p:extLst>
       <p:ext uri="{BB962C8B-B14F-4D97-AF65-F5344CB8AC3E}">
@@ -7028,7 +7253,7 @@
           <a:p>
             <a:r>
               <a:rPr lang="en-US" dirty="0" smtClean="0"/>
-              <a:t>Project Deliverables</a:t>
+              <a:t>Big Data Challenges</a:t>
             </a:r>
             <a:endParaRPr lang="en-US" dirty="0"/>
           </a:p>
@@ -7051,68 +7276,67 @@
           <a:p>
             <a:r>
               <a:rPr lang="en-US" dirty="0" smtClean="0"/>
-              <a:t>Visualization: 2D </a:t>
+              <a:t>311 dataset </a:t>
+            </a:r>
+          </a:p>
+          <a:p>
+            <a:pPr lvl="1"/>
+            <a:r>
+              <a:rPr lang="en-US" dirty="0" smtClean="0"/>
+              <a:t>86 complaint descriptor types for street related complaints </a:t>
+            </a:r>
+            <a:r>
+              <a:rPr lang="en-US" dirty="0"/>
+              <a:t>(pothole, </a:t>
+            </a:r>
+            <a:r>
+              <a:rPr lang="en-US" dirty="0" smtClean="0"/>
+              <a:t>traffic signal light, </a:t>
             </a:r>
             <a:r>
               <a:rPr lang="en-US" dirty="0" err="1" smtClean="0"/>
-              <a:t>Choropleth</a:t>
+              <a:t>etc</a:t>
             </a:r>
             <a:r>
               <a:rPr lang="en-US" dirty="0" smtClean="0"/>
-              <a:t> map</a:t>
+              <a:t>)</a:t>
+            </a:r>
+          </a:p>
+          <a:p>
+            <a:r>
+              <a:rPr lang="en-US" dirty="0" smtClean="0"/>
+              <a:t>NYPD Motor Vehicle accident dataset</a:t>
             </a:r>
           </a:p>
           <a:p>
             <a:pPr lvl="1"/>
             <a:r>
               <a:rPr lang="en-US" dirty="0" smtClean="0"/>
-              <a:t>Partitioned by ZIP</a:t>
-            </a:r>
+              <a:t>  47 unique accident factors (unsafe speed, fell asleep)</a:t>
+            </a:r>
+          </a:p>
+          <a:p>
+            <a:pPr lvl="1"/>
+            <a:r>
+              <a:rPr lang="en-US" dirty="0" smtClean="0"/>
+              <a:t>17 unique vehicle type classifiers (bus, bicycle)</a:t>
+            </a:r>
+          </a:p>
+          <a:p>
             <a:endParaRPr lang="en-US" dirty="0"/>
           </a:p>
         </p:txBody>
       </p:sp>
-      <p:pic>
-        <p:nvPicPr>
-          <p:cNvPr id="5" name="Picture 4"/>
-          <p:cNvPicPr>
-            <a:picLocks noChangeAspect="1"/>
-          </p:cNvPicPr>
-          <p:nvPr/>
-        </p:nvPicPr>
-        <p:blipFill>
-          <a:blip r:embed="rId2"/>
-          <a:stretch>
-            <a:fillRect/>
-          </a:stretch>
-        </p:blipFill>
-        <p:spPr>
-          <a:xfrm>
-            <a:off x="2192833" y="3465502"/>
-            <a:ext cx="4751246" cy="3178056"/>
-          </a:xfrm>
-          <a:prstGeom prst="rect">
-            <a:avLst/>
-          </a:prstGeom>
-        </p:spPr>
-      </p:pic>
     </p:spTree>
     <p:extLst>
       <p:ext uri="{BB962C8B-B14F-4D97-AF65-F5344CB8AC3E}">
-        <p14:creationId xmlns:p14="http://schemas.microsoft.com/office/powerpoint/2010/main" val="974367304"/>
+        <p14:creationId xmlns:p14="http://schemas.microsoft.com/office/powerpoint/2010/main" val="3902492831"/>
       </p:ext>
     </p:extLst>
   </p:cSld>
   <p:clrMapOvr>
     <a:masterClrMapping/>
   </p:clrMapOvr>
-  <p:timing>
-    <p:tnLst>
-      <p:par>
-        <p:cTn xmlns:p14="http://schemas.microsoft.com/office/powerpoint/2010/main" id="1" dur="indefinite" restart="never" nodeType="tmRoot"/>
-      </p:par>
-    </p:tnLst>
-  </p:timing>
 </p:sld>
 </file>
 
@@ -7133,13 +7357,38 @@
           <a:chExt cx="0" cy="0"/>
         </a:xfrm>
       </p:grpSpPr>
+      <p:sp>
+        <p:nvSpPr>
+          <p:cNvPr id="2" name="Title 1"/>
+          <p:cNvSpPr>
+            <a:spLocks noGrp="1"/>
+          </p:cNvSpPr>
+          <p:nvPr>
+            <p:ph type="title"/>
+          </p:nvPr>
+        </p:nvSpPr>
+        <p:spPr/>
+        <p:txBody>
+          <a:bodyPr/>
+          <a:lstStyle/>
+          <a:p>
+            <a:r>
+              <a:rPr lang="en-US" dirty="0" smtClean="0"/>
+              <a:t>Big Data Challenges</a:t>
+            </a:r>
+            <a:endParaRPr lang="en-US" dirty="0"/>
+          </a:p>
+        </p:txBody>
+      </p:sp>
       <p:pic>
         <p:nvPicPr>
-          <p:cNvPr id="11" name="Picture 10" descr="Screen Shot 2016-04-03 at 10.43.53 PM.png"/>
+          <p:cNvPr id="11" name="Content Placeholder 10" descr="Screen Shot 2016-05-16 at 2.45.05 AM.png"/>
           <p:cNvPicPr>
-            <a:picLocks noChangeAspect="1"/>
+            <a:picLocks noGrp="1" noChangeAspect="1"/>
           </p:cNvPicPr>
-          <p:nvPr/>
+          <p:nvPr>
+            <p:ph idx="1"/>
+          </p:nvPr>
         </p:nvPicPr>
         <p:blipFill>
           <a:blip r:embed="rId2">
@@ -7149,37 +7398,28 @@
               </a:ext>
             </a:extLst>
           </a:blip>
+          <a:srcRect l="11809" r="11809"/>
           <a:stretch>
             <a:fillRect/>
           </a:stretch>
         </p:blipFill>
         <p:spPr>
           <a:xfrm>
-            <a:off x="0" y="63500"/>
-            <a:ext cx="9144000" cy="6716389"/>
+            <a:off x="1309593" y="2595562"/>
+            <a:ext cx="7415307" cy="3670767"/>
           </a:xfrm>
-          <a:prstGeom prst="rect">
-            <a:avLst/>
-          </a:prstGeom>
         </p:spPr>
       </p:pic>
     </p:spTree>
     <p:extLst>
       <p:ext uri="{BB962C8B-B14F-4D97-AF65-F5344CB8AC3E}">
-        <p14:creationId xmlns:p14="http://schemas.microsoft.com/office/powerpoint/2010/main" val="494958113"/>
+        <p14:creationId xmlns:p14="http://schemas.microsoft.com/office/powerpoint/2010/main" val="2865855638"/>
       </p:ext>
     </p:extLst>
   </p:cSld>
   <p:clrMapOvr>
     <a:masterClrMapping/>
   </p:clrMapOvr>
-  <p:timing>
-    <p:tnLst>
-      <p:par>
-        <p:cTn xmlns:p14="http://schemas.microsoft.com/office/powerpoint/2010/main" id="1" dur="indefinite" restart="never" nodeType="tmRoot"/>
-      </p:par>
-    </p:tnLst>
-  </p:timing>
 </p:sld>
 </file>
 

</xml_diff>